<commit_message>
meine 4 Slides zur Simulation
</commit_message>
<xml_diff>
--- a/Dokumentation/Hochregallager1.pptx
+++ b/Dokumentation/Hochregallager1.pptx
@@ -5,10 +5,10 @@
     <p:sldMasterId id="2147483648" r:id="rId1"/>
   </p:sldMasterIdLst>
   <p:sldIdLst>
-    <p:sldId id="256" r:id="rId2"/>
-    <p:sldId id="257" r:id="rId3"/>
-    <p:sldId id="258" r:id="rId4"/>
-    <p:sldId id="259" r:id="rId5"/>
+    <p:sldId id="258" r:id="rId2"/>
+    <p:sldId id="261" r:id="rId3"/>
+    <p:sldId id="259" r:id="rId4"/>
+    <p:sldId id="260" r:id="rId5"/>
   </p:sldIdLst>
   <p:sldSz cx="12192000" cy="6858000"/>
   <p:notesSz cx="6858000" cy="9144000"/>
@@ -613,7 +613,7 @@
             <a:fld id="{B61BEF0D-F0BB-DE4B-95CE-6DB70DBA9567}" type="datetimeFigureOut">
               <a:rPr lang="en-US" dirty="0"/>
               <a:pPr/>
-              <a:t>7/11/2016</a:t>
+              <a:t>11/07/16</a:t>
             </a:fld>
             <a:endParaRPr lang="en-US" dirty="0"/>
           </a:p>
@@ -661,7 +661,7 @@
             <a:fld id="{D57F1E4F-1CFF-5643-939E-217C01CDF565}" type="slidenum">
               <a:rPr lang="en-US" dirty="0"/>
               <a:pPr/>
-              <a:t>‹Nr.›</a:t>
+              <a:t>‹#›</a:t>
             </a:fld>
             <a:endParaRPr lang="en-US" dirty="0"/>
           </a:p>
@@ -906,7 +906,7 @@
             <a:fld id="{B61BEF0D-F0BB-DE4B-95CE-6DB70DBA9567}" type="datetimeFigureOut">
               <a:rPr lang="en-US" dirty="0"/>
               <a:pPr/>
-              <a:t>7/11/2016</a:t>
+              <a:t>11/07/16</a:t>
             </a:fld>
             <a:endParaRPr lang="en-US" dirty="0"/>
           </a:p>
@@ -949,7 +949,7 @@
             <a:fld id="{D57F1E4F-1CFF-5643-939E-217C01CDF565}" type="slidenum">
               <a:rPr lang="en-US" dirty="0"/>
               <a:pPr/>
-              <a:t>‹Nr.›</a:t>
+              <a:t>‹#›</a:t>
             </a:fld>
             <a:endParaRPr lang="en-US" dirty="0"/>
           </a:p>
@@ -1151,7 +1151,7 @@
             <a:fld id="{B61BEF0D-F0BB-DE4B-95CE-6DB70DBA9567}" type="datetimeFigureOut">
               <a:rPr lang="en-US" dirty="0"/>
               <a:pPr/>
-              <a:t>7/11/2016</a:t>
+              <a:t>11/07/16</a:t>
             </a:fld>
             <a:endParaRPr lang="en-US" dirty="0"/>
           </a:p>
@@ -1194,7 +1194,7 @@
             <a:fld id="{D57F1E4F-1CFF-5643-939E-217C01CDF565}" type="slidenum">
               <a:rPr lang="en-US" dirty="0"/>
               <a:pPr/>
-              <a:t>‹Nr.›</a:t>
+              <a:t>‹#›</a:t>
             </a:fld>
             <a:endParaRPr lang="en-US" dirty="0"/>
           </a:p>
@@ -1688,7 +1688,7 @@
             <a:fld id="{B61BEF0D-F0BB-DE4B-95CE-6DB70DBA9567}" type="datetimeFigureOut">
               <a:rPr lang="en-US" dirty="0"/>
               <a:pPr/>
-              <a:t>7/11/2016</a:t>
+              <a:t>11/07/16</a:t>
             </a:fld>
             <a:endParaRPr lang="en-US" dirty="0"/>
           </a:p>
@@ -1731,7 +1731,7 @@
             <a:fld id="{D57F1E4F-1CFF-5643-939E-217C01CDF565}" type="slidenum">
               <a:rPr lang="en-US" dirty="0"/>
               <a:pPr/>
-              <a:t>‹Nr.›</a:t>
+              <a:t>‹#›</a:t>
             </a:fld>
             <a:endParaRPr lang="en-US" dirty="0"/>
           </a:p>
@@ -1933,7 +1933,7 @@
             <a:fld id="{B61BEF0D-F0BB-DE4B-95CE-6DB70DBA9567}" type="datetimeFigureOut">
               <a:rPr lang="en-US" dirty="0"/>
               <a:pPr/>
-              <a:t>7/11/2016</a:t>
+              <a:t>11/07/16</a:t>
             </a:fld>
             <a:endParaRPr lang="en-US" dirty="0"/>
           </a:p>
@@ -1976,7 +1976,7 @@
             <a:fld id="{D57F1E4F-1CFF-5643-939E-217C01CDF565}" type="slidenum">
               <a:rPr lang="en-US" dirty="0"/>
               <a:pPr/>
-              <a:t>‹Nr.›</a:t>
+              <a:t>‹#›</a:t>
             </a:fld>
             <a:endParaRPr lang="en-US" dirty="0"/>
           </a:p>
@@ -2462,7 +2462,7 @@
             <a:fld id="{B61BEF0D-F0BB-DE4B-95CE-6DB70DBA9567}" type="datetimeFigureOut">
               <a:rPr lang="en-US" dirty="0"/>
               <a:pPr/>
-              <a:t>7/11/2016</a:t>
+              <a:t>11/07/16</a:t>
             </a:fld>
             <a:endParaRPr lang="en-US" dirty="0"/>
           </a:p>
@@ -2505,7 +2505,7 @@
             <a:fld id="{D57F1E4F-1CFF-5643-939E-217C01CDF565}" type="slidenum">
               <a:rPr lang="en-US" dirty="0"/>
               <a:pPr/>
-              <a:t>‹Nr.›</a:t>
+              <a:t>‹#›</a:t>
             </a:fld>
             <a:endParaRPr lang="en-US" dirty="0"/>
           </a:p>
@@ -2756,7 +2756,7 @@
             <a:fld id="{B61BEF0D-F0BB-DE4B-95CE-6DB70DBA9567}" type="datetimeFigureOut">
               <a:rPr lang="en-US" dirty="0"/>
               <a:pPr/>
-              <a:t>7/11/2016</a:t>
+              <a:t>11/07/16</a:t>
             </a:fld>
             <a:endParaRPr lang="en-US" dirty="0"/>
           </a:p>
@@ -2799,7 +2799,7 @@
             <a:fld id="{D57F1E4F-1CFF-5643-939E-217C01CDF565}" type="slidenum">
               <a:rPr lang="en-US" dirty="0"/>
               <a:pPr/>
-              <a:t>‹Nr.›</a:t>
+              <a:t>‹#›</a:t>
             </a:fld>
             <a:endParaRPr lang="en-US" dirty="0"/>
           </a:p>
@@ -2927,7 +2927,7 @@
             <a:fld id="{B61BEF0D-F0BB-DE4B-95CE-6DB70DBA9567}" type="datetimeFigureOut">
               <a:rPr lang="en-US" dirty="0"/>
               <a:pPr/>
-              <a:t>7/11/2016</a:t>
+              <a:t>11/07/16</a:t>
             </a:fld>
             <a:endParaRPr lang="en-US" dirty="0"/>
           </a:p>
@@ -2970,7 +2970,7 @@
             <a:fld id="{D57F1E4F-1CFF-5643-939E-217C01CDF565}" type="slidenum">
               <a:rPr lang="en-US" dirty="0"/>
               <a:pPr/>
-              <a:t>‹Nr.›</a:t>
+              <a:t>‹#›</a:t>
             </a:fld>
             <a:endParaRPr lang="en-US" dirty="0"/>
           </a:p>
@@ -3104,7 +3104,7 @@
             <a:fld id="{B61BEF0D-F0BB-DE4B-95CE-6DB70DBA9567}" type="datetimeFigureOut">
               <a:rPr lang="en-US" dirty="0"/>
               <a:pPr/>
-              <a:t>7/11/2016</a:t>
+              <a:t>11/07/16</a:t>
             </a:fld>
             <a:endParaRPr lang="en-US" dirty="0"/>
           </a:p>
@@ -3147,7 +3147,7 @@
             <a:fld id="{D57F1E4F-1CFF-5643-939E-217C01CDF565}" type="slidenum">
               <a:rPr lang="en-US" dirty="0"/>
               <a:pPr/>
-              <a:t>‹Nr.›</a:t>
+              <a:t>‹#›</a:t>
             </a:fld>
             <a:endParaRPr lang="en-US" dirty="0"/>
           </a:p>
@@ -3271,7 +3271,7 @@
             <a:fld id="{B61BEF0D-F0BB-DE4B-95CE-6DB70DBA9567}" type="datetimeFigureOut">
               <a:rPr lang="en-US" dirty="0"/>
               <a:pPr/>
-              <a:t>7/11/2016</a:t>
+              <a:t>11/07/16</a:t>
             </a:fld>
             <a:endParaRPr lang="en-US" dirty="0"/>
           </a:p>
@@ -3319,7 +3319,7 @@
             <a:fld id="{D57F1E4F-1CFF-5643-939E-217C01CDF565}" type="slidenum">
               <a:rPr lang="en-US" dirty="0"/>
               <a:pPr/>
-              <a:t>‹Nr.›</a:t>
+              <a:t>‹#›</a:t>
             </a:fld>
             <a:endParaRPr lang="en-US" dirty="0"/>
           </a:p>
@@ -3519,7 +3519,7 @@
             <a:fld id="{B61BEF0D-F0BB-DE4B-95CE-6DB70DBA9567}" type="datetimeFigureOut">
               <a:rPr lang="en-US" dirty="0"/>
               <a:pPr/>
-              <a:t>7/11/2016</a:t>
+              <a:t>11/07/16</a:t>
             </a:fld>
             <a:endParaRPr lang="en-US" dirty="0"/>
           </a:p>
@@ -3562,7 +3562,7 @@
             <a:fld id="{D57F1E4F-1CFF-5643-939E-217C01CDF565}" type="slidenum">
               <a:rPr lang="en-US" dirty="0"/>
               <a:pPr/>
-              <a:t>‹Nr.›</a:t>
+              <a:t>‹#›</a:t>
             </a:fld>
             <a:endParaRPr lang="en-US" dirty="0"/>
           </a:p>
@@ -3813,7 +3813,7 @@
             <a:fld id="{B61BEF0D-F0BB-DE4B-95CE-6DB70DBA9567}" type="datetimeFigureOut">
               <a:rPr lang="en-US" dirty="0"/>
               <a:pPr/>
-              <a:t>7/11/2016</a:t>
+              <a:t>11/07/16</a:t>
             </a:fld>
             <a:endParaRPr lang="en-US" dirty="0"/>
           </a:p>
@@ -3856,7 +3856,7 @@
             <a:fld id="{D57F1E4F-1CFF-5643-939E-217C01CDF565}" type="slidenum">
               <a:rPr lang="en-US" dirty="0"/>
               <a:pPr/>
-              <a:t>‹Nr.›</a:t>
+              <a:t>‹#›</a:t>
             </a:fld>
             <a:endParaRPr lang="en-US" dirty="0"/>
           </a:p>
@@ -4252,7 +4252,7 @@
             <a:fld id="{B61BEF0D-F0BB-DE4B-95CE-6DB70DBA9567}" type="datetimeFigureOut">
               <a:rPr lang="en-US" dirty="0"/>
               <a:pPr/>
-              <a:t>7/11/2016</a:t>
+              <a:t>11/07/16</a:t>
             </a:fld>
             <a:endParaRPr lang="en-US" dirty="0"/>
           </a:p>
@@ -4295,7 +4295,7 @@
             <a:fld id="{D57F1E4F-1CFF-5643-939E-217C01CDF565}" type="slidenum">
               <a:rPr lang="en-US" dirty="0"/>
               <a:pPr/>
-              <a:t>‹Nr.›</a:t>
+              <a:t>‹#›</a:t>
             </a:fld>
             <a:endParaRPr lang="en-US" dirty="0"/>
           </a:p>
@@ -4367,7 +4367,7 @@
             <a:fld id="{B61BEF0D-F0BB-DE4B-95CE-6DB70DBA9567}" type="datetimeFigureOut">
               <a:rPr lang="en-US" dirty="0"/>
               <a:pPr/>
-              <a:t>7/11/2016</a:t>
+              <a:t>11/07/16</a:t>
             </a:fld>
             <a:endParaRPr lang="en-US" dirty="0"/>
           </a:p>
@@ -4410,7 +4410,7 @@
             <a:fld id="{D57F1E4F-1CFF-5643-939E-217C01CDF565}" type="slidenum">
               <a:rPr lang="en-US" dirty="0"/>
               <a:pPr/>
-              <a:t>‹Nr.›</a:t>
+              <a:t>‹#›</a:t>
             </a:fld>
             <a:endParaRPr lang="en-US" dirty="0"/>
           </a:p>
@@ -4459,7 +4459,7 @@
             <a:fld id="{B61BEF0D-F0BB-DE4B-95CE-6DB70DBA9567}" type="datetimeFigureOut">
               <a:rPr lang="en-US" dirty="0"/>
               <a:pPr/>
-              <a:t>7/11/2016</a:t>
+              <a:t>11/07/16</a:t>
             </a:fld>
             <a:endParaRPr lang="en-US" dirty="0"/>
           </a:p>
@@ -4502,7 +4502,7 @@
             <a:fld id="{D57F1E4F-1CFF-5643-939E-217C01CDF565}" type="slidenum">
               <a:rPr lang="en-US" dirty="0"/>
               <a:pPr/>
-              <a:t>‹Nr.›</a:t>
+              <a:t>‹#›</a:t>
             </a:fld>
             <a:endParaRPr lang="en-US" dirty="0"/>
           </a:p>
@@ -4739,7 +4739,7 @@
             <a:fld id="{B61BEF0D-F0BB-DE4B-95CE-6DB70DBA9567}" type="datetimeFigureOut">
               <a:rPr lang="en-US" dirty="0"/>
               <a:pPr/>
-              <a:t>7/11/2016</a:t>
+              <a:t>11/07/16</a:t>
             </a:fld>
             <a:endParaRPr lang="en-US" dirty="0"/>
           </a:p>
@@ -4782,7 +4782,7 @@
             <a:fld id="{D57F1E4F-1CFF-5643-939E-217C01CDF565}" type="slidenum">
               <a:rPr lang="en-US" dirty="0"/>
               <a:pPr/>
-              <a:t>‹Nr.›</a:t>
+              <a:t>‹#›</a:t>
             </a:fld>
             <a:endParaRPr lang="en-US" dirty="0"/>
           </a:p>
@@ -5027,7 +5027,7 @@
             <a:fld id="{B61BEF0D-F0BB-DE4B-95CE-6DB70DBA9567}" type="datetimeFigureOut">
               <a:rPr lang="en-US" dirty="0"/>
               <a:pPr/>
-              <a:t>7/11/2016</a:t>
+              <a:t>11/07/16</a:t>
             </a:fld>
             <a:endParaRPr lang="en-US" dirty="0"/>
           </a:p>
@@ -5070,7 +5070,7 @@
             <a:fld id="{D57F1E4F-1CFF-5643-939E-217C01CDF565}" type="slidenum">
               <a:rPr lang="en-US" dirty="0"/>
               <a:pPr/>
-              <a:t>‹Nr.›</a:t>
+              <a:t>‹#›</a:t>
             </a:fld>
             <a:endParaRPr lang="en-US" dirty="0"/>
           </a:p>
@@ -5554,7 +5554,7 @@
             <a:fld id="{B61BEF0D-F0BB-DE4B-95CE-6DB70DBA9567}" type="datetimeFigureOut">
               <a:rPr lang="en-US" dirty="0"/>
               <a:pPr/>
-              <a:t>7/11/2016</a:t>
+              <a:t>11/07/16</a:t>
             </a:fld>
             <a:endParaRPr lang="en-US" dirty="0"/>
           </a:p>
@@ -5633,7 +5633,7 @@
             <a:fld id="{D57F1E4F-1CFF-5643-939E-217C01CDF565}" type="slidenum">
               <a:rPr lang="en-US" dirty="0"/>
               <a:pPr/>
-              <a:t>‹Nr.›</a:t>
+              <a:t>‹#›</a:t>
             </a:fld>
             <a:endParaRPr lang="en-US" dirty="0"/>
           </a:p>
@@ -6088,7 +6088,7 @@
             <a:spLocks noGrp="1"/>
           </p:cNvSpPr>
           <p:nvPr>
-            <p:ph type="ctrTitle"/>
+            <p:ph type="title"/>
           </p:nvPr>
         </p:nvSpPr>
         <p:spPr/>
@@ -6097,52 +6097,12 @@
           <a:lstStyle/>
           <a:p>
             <a:r>
+              <a:rPr lang="de-DE" sz="6000" dirty="0" smtClean="0"/>
+              <a:t>Simulation</a:t>
+            </a:r>
+            <a:r>
               <a:rPr lang="de-DE" dirty="0" smtClean="0"/>
-              <a:t>Hochregallager</a:t>
-            </a:r>
-            <a:endParaRPr lang="de-DE" dirty="0"/>
-          </a:p>
-        </p:txBody>
-      </p:sp>
-      <p:sp>
-        <p:nvSpPr>
-          <p:cNvPr id="3" name="Untertitel 2"/>
-          <p:cNvSpPr>
-            <a:spLocks noGrp="1"/>
-          </p:cNvSpPr>
-          <p:nvPr>
-            <p:ph type="subTitle" idx="1"/>
-          </p:nvPr>
-        </p:nvSpPr>
-        <p:spPr>
-          <a:xfrm>
-            <a:off x="2928401" y="3996267"/>
-            <a:ext cx="8574621" cy="1388534"/>
-          </a:xfrm>
-        </p:spPr>
-        <p:txBody>
-          <a:bodyPr/>
-          <a:lstStyle/>
-          <a:p>
-            <a:r>
-              <a:rPr lang="de-DE" dirty="0" smtClean="0"/>
-              <a:t>Von Michael Thomas,  Andreas </a:t>
-            </a:r>
-            <a:r>
-              <a:rPr lang="de-DE" dirty="0" err="1" smtClean="0"/>
-              <a:t>Glatz</a:t>
-            </a:r>
-            <a:r>
-              <a:rPr lang="de-DE" dirty="0" smtClean="0"/>
-              <a:t>, Simon Weitzel, Felix </a:t>
-            </a:r>
-            <a:r>
-              <a:rPr lang="de-DE" dirty="0" err="1" smtClean="0"/>
-              <a:t>Baral</a:t>
-            </a:r>
-            <a:r>
-              <a:rPr lang="de-DE" dirty="0" smtClean="0"/>
-              <a:t> - Weber</a:t>
+              <a:t>:</a:t>
             </a:r>
             <a:endParaRPr lang="de-DE" dirty="0"/>
           </a:p>
@@ -6151,20 +6111,13 @@
     </p:spTree>
     <p:extLst>
       <p:ext uri="{BB962C8B-B14F-4D97-AF65-F5344CB8AC3E}">
-        <p14:creationId xmlns:p14="http://schemas.microsoft.com/office/powerpoint/2010/main" val="581806893"/>
+        <p14:creationId xmlns:p14="http://schemas.microsoft.com/office/powerpoint/2010/main" val="3772480790"/>
       </p:ext>
     </p:extLst>
   </p:cSld>
   <p:clrMapOvr>
     <a:masterClrMapping/>
   </p:clrMapOvr>
-  <p:timing>
-    <p:tnLst>
-      <p:par>
-        <p:cTn id="1" dur="indefinite" restart="never" nodeType="tmRoot"/>
-      </p:par>
-    </p:tnLst>
-  </p:timing>
 </p:sld>
 </file>
 
@@ -6200,73 +6153,88 @@
           <a:bodyPr/>
           <a:lstStyle/>
           <a:p>
-            <a:r>
-              <a:rPr lang="de-DE" dirty="0" smtClean="0"/>
-              <a:t>Gliederung</a:t>
-            </a:r>
             <a:endParaRPr lang="de-DE" dirty="0"/>
           </a:p>
         </p:txBody>
       </p:sp>
       <p:sp>
         <p:nvSpPr>
-          <p:cNvPr id="3" name="Inhaltsplatzhalter 2"/>
-          <p:cNvSpPr>
-            <a:spLocks noGrp="1"/>
-          </p:cNvSpPr>
-          <p:nvPr>
-            <p:ph idx="1"/>
+          <p:cNvPr id="3" name="Content Placeholder 2"/>
+          <p:cNvSpPr>
+            <a:spLocks noGrp="1"/>
+          </p:cNvSpPr>
+          <p:nvPr>
+            <p:ph sz="half" idx="1"/>
           </p:nvPr>
         </p:nvSpPr>
         <p:spPr/>
         <p:txBody>
-          <a:bodyPr>
-            <a:normAutofit/>
-          </a:bodyPr>
-          <a:lstStyle/>
-          <a:p>
-            <a:r>
-              <a:rPr lang="de-DE" sz="2800" dirty="0" smtClean="0"/>
-              <a:t>Ein- und Ausgabe</a:t>
-            </a:r>
-          </a:p>
-          <a:p>
-            <a:r>
-              <a:rPr lang="de-DE" sz="2800" dirty="0"/>
-              <a:t>Steuerung</a:t>
-            </a:r>
-          </a:p>
-          <a:p>
-            <a:r>
-              <a:rPr lang="de-DE" sz="2800" dirty="0" smtClean="0"/>
-              <a:t>Simulation</a:t>
-            </a:r>
-          </a:p>
-          <a:p>
-            <a:r>
-              <a:rPr lang="de-DE" sz="2800" dirty="0" smtClean="0"/>
-              <a:t>Tests</a:t>
-            </a:r>
-          </a:p>
-        </p:txBody>
-      </p:sp>
+          <a:bodyPr/>
+          <a:lstStyle/>
+          <a:p>
+            <a:endParaRPr lang="en-US"/>
+          </a:p>
+        </p:txBody>
+      </p:sp>
+      <p:sp>
+        <p:nvSpPr>
+          <p:cNvPr id="4" name="Content Placeholder 3"/>
+          <p:cNvSpPr>
+            <a:spLocks noGrp="1"/>
+          </p:cNvSpPr>
+          <p:nvPr>
+            <p:ph sz="half" idx="2"/>
+          </p:nvPr>
+        </p:nvSpPr>
+        <p:spPr/>
+        <p:txBody>
+          <a:bodyPr/>
+          <a:lstStyle/>
+          <a:p>
+            <a:endParaRPr lang="en-US"/>
+          </a:p>
+        </p:txBody>
+      </p:sp>
+      <p:pic>
+        <p:nvPicPr>
+          <p:cNvPr id="5" name="Picture 4" descr="dfd1_simulation1_1.png"/>
+          <p:cNvPicPr>
+            <a:picLocks noChangeAspect="1"/>
+          </p:cNvPicPr>
+          <p:nvPr/>
+        </p:nvPicPr>
+        <p:blipFill>
+          <a:blip r:embed="rId2">
+            <a:extLst>
+              <a:ext uri="{28A0092B-C50C-407E-A947-70E740481C1C}">
+                <a14:useLocalDpi xmlns:a14="http://schemas.microsoft.com/office/drawing/2010/main" val="0"/>
+              </a:ext>
+            </a:extLst>
+          </a:blip>
+          <a:stretch>
+            <a:fillRect/>
+          </a:stretch>
+        </p:blipFill>
+        <p:spPr>
+          <a:xfrm>
+            <a:off x="769717" y="0"/>
+            <a:ext cx="10623328" cy="6858000"/>
+          </a:xfrm>
+          <a:prstGeom prst="rect">
+            <a:avLst/>
+          </a:prstGeom>
+        </p:spPr>
+      </p:pic>
     </p:spTree>
     <p:extLst>
       <p:ext uri="{BB962C8B-B14F-4D97-AF65-F5344CB8AC3E}">
-        <p14:creationId xmlns:p14="http://schemas.microsoft.com/office/powerpoint/2010/main" val="3103303348"/>
+        <p14:creationId xmlns:p14="http://schemas.microsoft.com/office/powerpoint/2010/main" val="2508724430"/>
       </p:ext>
     </p:extLst>
   </p:cSld>
   <p:clrMapOvr>
     <a:masterClrMapping/>
   </p:clrMapOvr>
-  <p:timing>
-    <p:tnLst>
-      <p:par>
-        <p:cTn id="1" dur="indefinite" restart="never" nodeType="tmRoot"/>
-      </p:par>
-    </p:tnLst>
-  </p:timing>
 </p:sld>
 </file>
 
@@ -6304,50 +6272,60 @@
           <a:p>
             <a:r>
               <a:rPr lang="de-DE" dirty="0" smtClean="0"/>
-              <a:t>Einführung</a:t>
+              <a:t>Gantt Diagramm der Simulation</a:t>
             </a:r>
             <a:endParaRPr lang="de-DE" dirty="0"/>
+          </a:p>
+        </p:txBody>
+      </p:sp>
+      <p:sp>
+        <p:nvSpPr>
+          <p:cNvPr id="3" name="Content Placeholder 2"/>
+          <p:cNvSpPr>
+            <a:spLocks noGrp="1"/>
+          </p:cNvSpPr>
+          <p:nvPr>
+            <p:ph sz="half" idx="1"/>
+          </p:nvPr>
+        </p:nvSpPr>
+        <p:spPr/>
+        <p:txBody>
+          <a:bodyPr/>
+          <a:lstStyle/>
+          <a:p>
+            <a:endParaRPr lang="en-US"/>
+          </a:p>
+        </p:txBody>
+      </p:sp>
+      <p:sp>
+        <p:nvSpPr>
+          <p:cNvPr id="4" name="Content Placeholder 3"/>
+          <p:cNvSpPr>
+            <a:spLocks noGrp="1"/>
+          </p:cNvSpPr>
+          <p:nvPr>
+            <p:ph sz="half" idx="2"/>
+          </p:nvPr>
+        </p:nvSpPr>
+        <p:spPr/>
+        <p:txBody>
+          <a:bodyPr/>
+          <a:lstStyle/>
+          <a:p>
+            <a:endParaRPr lang="en-US"/>
           </a:p>
         </p:txBody>
       </p:sp>
       <p:pic>
         <p:nvPicPr>
-          <p:cNvPr id="9" name="Inhaltsplatzhalter 8"/>
+          <p:cNvPr id="5" name="Picture 4" descr="gand.png"/>
           <p:cNvPicPr>
-            <a:picLocks noGrp="1" noChangeAspect="1"/>
+            <a:picLocks noChangeAspect="1"/>
           </p:cNvPicPr>
-          <p:nvPr>
-            <p:ph sz="half" idx="1"/>
-          </p:nvPr>
+          <p:nvPr/>
         </p:nvPicPr>
         <p:blipFill>
-          <a:blip r:embed="rId2"/>
-          <a:stretch>
-            <a:fillRect/>
-          </a:stretch>
-        </p:blipFill>
-        <p:spPr>
-          <a:xfrm>
-            <a:off x="1484313" y="2912402"/>
-            <a:ext cx="4894262" cy="2633396"/>
-          </a:xfrm>
-          <a:prstGeom prst="rect">
-            <a:avLst/>
-          </a:prstGeom>
-        </p:spPr>
-      </p:pic>
-      <p:pic>
-        <p:nvPicPr>
-          <p:cNvPr id="8" name="Inhaltsplatzhalter 7"/>
-          <p:cNvPicPr>
-            <a:picLocks noGrp="1" noChangeAspect="1"/>
-          </p:cNvPicPr>
-          <p:nvPr>
-            <p:ph sz="half" idx="2"/>
-          </p:nvPr>
-        </p:nvPicPr>
-        <p:blipFill>
-          <a:blip r:embed="rId3">
+          <a:blip r:embed="rId2">
             <a:extLst>
               <a:ext uri="{28A0092B-C50C-407E-A947-70E740481C1C}">
                 <a14:useLocalDpi xmlns:a14="http://schemas.microsoft.com/office/drawing/2010/main" val="0"/>
@@ -6360,15 +6338,18 @@
         </p:blipFill>
         <p:spPr>
           <a:xfrm>
-            <a:off x="6635749" y="2912402"/>
-            <a:ext cx="4867275" cy="2633396"/>
+            <a:off x="0" y="2605860"/>
+            <a:ext cx="12192000" cy="3200271"/>
           </a:xfrm>
+          <a:prstGeom prst="rect">
+            <a:avLst/>
+          </a:prstGeom>
         </p:spPr>
       </p:pic>
     </p:spTree>
     <p:extLst>
       <p:ext uri="{BB962C8B-B14F-4D97-AF65-F5344CB8AC3E}">
-        <p14:creationId xmlns:p14="http://schemas.microsoft.com/office/powerpoint/2010/main" val="3772480790"/>
+        <p14:creationId xmlns:p14="http://schemas.microsoft.com/office/powerpoint/2010/main" val="1494879534"/>
       </p:ext>
     </p:extLst>
   </p:cSld>
@@ -6397,12 +6378,12 @@
       </p:grpSpPr>
       <p:sp>
         <p:nvSpPr>
-          <p:cNvPr id="2" name="Titel 1"/>
-          <p:cNvSpPr>
-            <a:spLocks noGrp="1"/>
-          </p:cNvSpPr>
-          <p:nvPr>
-            <p:ph type="title"/>
+          <p:cNvPr id="3" name="Content Placeholder 2"/>
+          <p:cNvSpPr>
+            <a:spLocks noGrp="1"/>
+          </p:cNvSpPr>
+          <p:nvPr>
+            <p:ph sz="half" idx="1"/>
           </p:nvPr>
         </p:nvSpPr>
         <p:spPr/>
@@ -6410,22 +6391,18 @@
           <a:bodyPr/>
           <a:lstStyle/>
           <a:p>
-            <a:r>
-              <a:rPr lang="de-DE" dirty="0" smtClean="0"/>
-              <a:t>Eingabe</a:t>
-            </a:r>
-            <a:endParaRPr lang="de-DE" dirty="0"/>
-          </a:p>
-        </p:txBody>
-      </p:sp>
-      <p:sp>
-        <p:nvSpPr>
-          <p:cNvPr id="5" name="Inhaltsplatzhalter 4"/>
-          <p:cNvSpPr>
-            <a:spLocks noGrp="1"/>
-          </p:cNvSpPr>
-          <p:nvPr>
-            <p:ph idx="1"/>
+            <a:endParaRPr lang="en-US" dirty="0"/>
+          </a:p>
+        </p:txBody>
+      </p:sp>
+      <p:sp>
+        <p:nvSpPr>
+          <p:cNvPr id="4" name="Content Placeholder 3"/>
+          <p:cNvSpPr>
+            <a:spLocks noGrp="1"/>
+          </p:cNvSpPr>
+          <p:nvPr>
+            <p:ph sz="half" idx="2"/>
           </p:nvPr>
         </p:nvSpPr>
         <p:spPr/>
@@ -6433,14 +6410,74 @@
           <a:bodyPr/>
           <a:lstStyle/>
           <a:p>
-            <a:endParaRPr lang="de-DE" dirty="0"/>
-          </a:p>
-        </p:txBody>
-      </p:sp>
+            <a:endParaRPr lang="en-US"/>
+          </a:p>
+        </p:txBody>
+      </p:sp>
+      <p:pic>
+        <p:nvPicPr>
+          <p:cNvPr id="5" name="Picture 4" descr="auflegernachoben.jpg"/>
+          <p:cNvPicPr>
+            <a:picLocks noChangeAspect="1"/>
+          </p:cNvPicPr>
+          <p:nvPr/>
+        </p:nvPicPr>
+        <p:blipFill>
+          <a:blip r:embed="rId2">
+            <a:extLst>
+              <a:ext uri="{28A0092B-C50C-407E-A947-70E740481C1C}">
+                <a14:useLocalDpi xmlns:a14="http://schemas.microsoft.com/office/drawing/2010/main" val="0"/>
+              </a:ext>
+            </a:extLst>
+          </a:blip>
+          <a:stretch>
+            <a:fillRect/>
+          </a:stretch>
+        </p:blipFill>
+        <p:spPr>
+          <a:xfrm>
+            <a:off x="6171960" y="910765"/>
+            <a:ext cx="5930239" cy="5156729"/>
+          </a:xfrm>
+          <a:prstGeom prst="rect">
+            <a:avLst/>
+          </a:prstGeom>
+        </p:spPr>
+      </p:pic>
+      <p:pic>
+        <p:nvPicPr>
+          <p:cNvPr id="6" name="Picture 5" descr="vonunten.jpg"/>
+          <p:cNvPicPr>
+            <a:picLocks noChangeAspect="1"/>
+          </p:cNvPicPr>
+          <p:nvPr/>
+        </p:nvPicPr>
+        <p:blipFill>
+          <a:blip r:embed="rId3">
+            <a:extLst>
+              <a:ext uri="{28A0092B-C50C-407E-A947-70E740481C1C}">
+                <a14:useLocalDpi xmlns:a14="http://schemas.microsoft.com/office/drawing/2010/main" val="0"/>
+              </a:ext>
+            </a:extLst>
+          </a:blip>
+          <a:stretch>
+            <a:fillRect/>
+          </a:stretch>
+        </p:blipFill>
+        <p:spPr>
+          <a:xfrm>
+            <a:off x="153944" y="954699"/>
+            <a:ext cx="5811366" cy="5035828"/>
+          </a:xfrm>
+          <a:prstGeom prst="rect">
+            <a:avLst/>
+          </a:prstGeom>
+        </p:spPr>
+      </p:pic>
     </p:spTree>
     <p:extLst>
       <p:ext uri="{BB962C8B-B14F-4D97-AF65-F5344CB8AC3E}">
-        <p14:creationId xmlns:p14="http://schemas.microsoft.com/office/powerpoint/2010/main" val="698935717"/>
+        <p14:creationId xmlns:p14="http://schemas.microsoft.com/office/powerpoint/2010/main" val="2656501477"/>
       </p:ext>
     </p:extLst>
   </p:cSld>
@@ -6493,7 +6530,7 @@
     </a:clrScheme>
     <a:fontScheme name="Parallax">
       <a:majorFont>
-        <a:latin typeface="Corbel" panose="020B0503020204020204"/>
+        <a:latin typeface="Corbel"/>
         <a:ea typeface=""/>
         <a:cs typeface=""/>
         <a:font script="Jpan" typeface="HGｺﾞｼｯｸM"/>
@@ -6528,7 +6565,7 @@
         <a:font script="Geor" typeface="Sylfaen"/>
       </a:majorFont>
       <a:minorFont>
-        <a:latin typeface="Corbel" panose="020B0503020204020204"/>
+        <a:latin typeface="Corbel"/>
         <a:ea typeface=""/>
         <a:cs typeface=""/>
         <a:font script="Jpan" typeface="HGｺﾞｼｯｸM"/>
@@ -6700,7 +6737,7 @@
   <a:extraClrSchemeLst/>
   <a:extLst>
     <a:ext uri="{05A4C25C-085E-4340-85A3-A5531E510DB2}">
-      <thm15:themeFamily xmlns:thm15="http://schemas.microsoft.com/office/thememl/2012/main" name="Parallax" id="{3388167B-A2EB-4685-9635-1831D9AEF8C4}" vid="{93B4CCAC-FD5A-4D59-B1AC-EAF45910B5A9}"/>
+      <thm15:themeFamily xmlns:thm15="http://schemas.microsoft.com/office/thememl/2012/main" xmlns="" name="Parallax" id="{3388167B-A2EB-4685-9635-1831D9AEF8C4}" vid="{93B4CCAC-FD5A-4D59-B1AC-EAF45910B5A9}"/>
     </a:ext>
   </a:extLst>
 </a:theme>

</xml_diff>